<commit_message>
Modelo de slide v1.0 :white_check_mark:
</commit_message>
<xml_diff>
--- a/seminario-spiceworks.pptx
+++ b/seminario-spiceworks.pptx
@@ -106,6 +106,11 @@
       </a:defRPr>
     </a:lvl9pPr>
   </p:defaultTextStyle>
+  <p:extLst>
+    <p:ext uri="{EFAFB233-063F-42B5-8137-9DF3F51BA10A}">
+      <p15:sldGuideLst xmlns:p15="http://schemas.microsoft.com/office/powerpoint/2012/main"/>
+    </p:ext>
+  </p:extLst>
 </p:presentation>
 </file>
 
@@ -3654,7 +3659,7 @@
                 <a:latin typeface="Arial" panose="020B0604020202020204" pitchFamily="34" charset="0"/>
                 <a:cs typeface="Arial" panose="020B0604020202020204" pitchFamily="34" charset="0"/>
               </a:rPr>
-              <a:t> Asael Paulinho, Diogo Espindola, Gabriel Carvalho, Ryan Maia.</a:t>
+              <a:t> Asael Paulino, Diogo Espindola, Gabriel Carvalho, Ryan Maia.</a:t>
             </a:r>
           </a:p>
         </p:txBody>

</xml_diff>